<commit_message>
Updated a link inside chapter 2
</commit_message>
<xml_diff>
--- a/Chapter 2 - Subsystems&Commands/WPIlibCommandBasedRobot.pptx
+++ b/Chapter 2 - Subsystems&Commands/WPIlibCommandBasedRobot.pptx
@@ -269,7 +269,7 @@
       <p15:sldGuideLst xmlns:p15="http://schemas.microsoft.com/office/powerpoint/2012/main"/>
     </p:ext>
     <p:ext uri="http://customooxmlschemas.google.com/">
-      <go:slidesCustomData xmlns:go="http://customooxmlschemas.google.com/" xmlns:ahyp="http://schemas.microsoft.com/office/drawing/2018/hyperlinkcolor" xmlns:p15="http://schemas.microsoft.com/office/powerpoint/2012/main" xmlns:p14="http://schemas.microsoft.com/office/powerpoint/2010/main" xmlns:com="http://schemas.openxmlformats.org/drawingml/2006/compatibility" xmlns:pvml="urn:schemas-microsoft-com:office:powerpoint" xmlns:v="urn:schemas-microsoft-com:vml" xmlns:o="urn:schemas-microsoft-com:office:office" xmlns:dgm="http://schemas.openxmlformats.org/drawingml/2006/diagram" xmlns:c="http://schemas.openxmlformats.org/drawingml/2006/chart" xmlns:mv="urn:schemas-microsoft-com:mac:vml" xmlns:mc="http://schemas.openxmlformats.org/markup-compatibility/2006" xmlns="" r:id="rId38" roundtripDataSignature="AMtx7mhUVJU3jbxGl11X7yrLJ5REy1msmg=="/>
+      <go:slidesCustomData xmlns="" xmlns:mc="http://schemas.openxmlformats.org/markup-compatibility/2006" xmlns:mv="urn:schemas-microsoft-com:mac:vml" xmlns:c="http://schemas.openxmlformats.org/drawingml/2006/chart" xmlns:dgm="http://schemas.openxmlformats.org/drawingml/2006/diagram" xmlns:o="urn:schemas-microsoft-com:office:office" xmlns:v="urn:schemas-microsoft-com:vml" xmlns:pvml="urn:schemas-microsoft-com:office:powerpoint" xmlns:com="http://schemas.openxmlformats.org/drawingml/2006/compatibility" xmlns:p14="http://schemas.microsoft.com/office/powerpoint/2010/main" xmlns:p15="http://schemas.microsoft.com/office/powerpoint/2012/main" xmlns:ahyp="http://schemas.microsoft.com/office/drawing/2018/hyperlinkcolor" xmlns:go="http://customooxmlschemas.google.com/" r:id="rId38" roundtripDataSignature="AMtx7mhUVJU3jbxGl11X7yrLJ5REy1msmg=="/>
     </p:ext>
   </p:extLst>
 </p:presentation>
@@ -23937,7 +23937,13 @@
             </a:r>
             <a:r>
               <a:rPr lang="en-GB" i="1" dirty="0"/>
-              <a:t> is a helper class we created, you can view the source code here</a:t>
+              <a:t> is a helper class we created, you can view the source code </a:t>
+            </a:r>
+            <a:r>
+              <a:rPr lang="en-GB" i="1" dirty="0">
+                <a:hlinkClick r:id="rId5"/>
+              </a:rPr>
+              <a:t>here</a:t>
             </a:r>
             <a:endParaRPr lang="en-IL" b="1" i="1" dirty="0"/>
           </a:p>

</xml_diff>